<commit_message>
R\Lab2\Little changes in final slides
</commit_message>
<xml_diff>
--- a/R/Lab2/Slides.pptx
+++ b/R/Lab2/Slides.pptx
@@ -19,7 +19,8 @@
     <p:sldId id="266" r:id="rId13"/>
     <p:sldId id="267" r:id="rId14"/>
     <p:sldId id="268" r:id="rId15"/>
-    <p:sldId id="270" r:id="rId16"/>
+    <p:sldId id="271" r:id="rId16"/>
+    <p:sldId id="270" r:id="rId17"/>
   </p:sldIdLst>
   <p:sldSz cx="12192000" cy="6858000"/>
   <p:notesSz cx="6858000" cy="9144000"/>
@@ -118,6 +119,11 @@
       </a:defRPr>
     </a:lvl9pPr>
   </p:defaultTextStyle>
+  <p:extLst>
+    <p:ext uri="{EFAFB233-063F-42B5-8137-9DF3F51BA10A}">
+      <p15:sldGuideLst xmlns:p15="http://schemas.microsoft.com/office/powerpoint/2012/main"/>
+    </p:ext>
+  </p:extLst>
 </p:presentation>
 </file>
 
@@ -269,7 +275,7 @@
           <a:p>
             <a:fld id="{073D55F9-11A3-4523-8F38-6BA37933791A}" type="datetime1">
               <a:rPr lang="en-US" smtClean="0"/>
-              <a:t>11/3/2025</a:t>
+              <a:t>11/4/2025</a:t>
             </a:fld>
             <a:endParaRPr lang="en-US"/>
           </a:p>
@@ -474,7 +480,7 @@
           <a:p>
             <a:fld id="{0B4E757A-3EC2-4683-9080-1A460C37C843}" type="datetime1">
               <a:rPr lang="en-US" smtClean="0"/>
-              <a:t>11/3/2025</a:t>
+              <a:t>11/4/2025</a:t>
             </a:fld>
             <a:endParaRPr lang="en-US"/>
           </a:p>
@@ -693,7 +699,7 @@
           <a:p>
             <a:fld id="{5CC8096C-64ED-4153-A483-5C02E44AD5C3}" type="datetime1">
               <a:rPr lang="en-US" smtClean="0"/>
-              <a:t>11/3/2025</a:t>
+              <a:t>11/4/2025</a:t>
             </a:fld>
             <a:endParaRPr lang="en-US" dirty="0"/>
           </a:p>
@@ -929,7 +935,7 @@
           <a:p>
             <a:fld id="{1CB9D56B-6EBE-4E5F-99D9-2A3DBDF37D0A}" type="datetime1">
               <a:rPr lang="en-US" smtClean="0"/>
-              <a:t>11/3/2025</a:t>
+              <a:t>11/4/2025</a:t>
             </a:fld>
             <a:endParaRPr lang="en-US"/>
           </a:p>
@@ -1209,7 +1215,7 @@
           <a:p>
             <a:fld id="{8C33F3CA-C7E3-432D-9282-18F13836509A}" type="datetime1">
               <a:rPr lang="en-US" smtClean="0"/>
-              <a:t>11/3/2025</a:t>
+              <a:t>11/4/2025</a:t>
             </a:fld>
             <a:endParaRPr lang="en-US" dirty="0"/>
           </a:p>
@@ -1482,7 +1488,7 @@
           <a:p>
             <a:fld id="{75BE9C62-1337-40B8-BA50-E9F4861DB4BC}" type="datetime1">
               <a:rPr lang="en-US" smtClean="0"/>
-              <a:t>11/3/2025</a:t>
+              <a:t>11/4/2025</a:t>
             </a:fld>
             <a:endParaRPr lang="en-US"/>
           </a:p>
@@ -1902,7 +1908,7 @@
           <a:p>
             <a:fld id="{47C195EB-2DA3-4B24-8725-19BC22A7BE50}" type="datetime1">
               <a:rPr lang="en-US" smtClean="0"/>
-              <a:t>11/3/2025</a:t>
+              <a:t>11/4/2025</a:t>
             </a:fld>
             <a:endParaRPr lang="en-US"/>
           </a:p>
@@ -2050,7 +2056,7 @@
           <a:p>
             <a:fld id="{F4E237E6-0076-4915-A5A8-B7C11FA4F374}" type="datetime1">
               <a:rPr lang="en-US" smtClean="0"/>
-              <a:t>11/3/2025</a:t>
+              <a:t>11/4/2025</a:t>
             </a:fld>
             <a:endParaRPr lang="en-US"/>
           </a:p>
@@ -2169,7 +2175,7 @@
           <a:p>
             <a:fld id="{3505F58F-C0B5-422A-8E5A-6B99E5D80F0A}" type="datetime1">
               <a:rPr lang="en-US" smtClean="0"/>
-              <a:t>11/3/2025</a:t>
+              <a:t>11/4/2025</a:t>
             </a:fld>
             <a:endParaRPr lang="en-US"/>
           </a:p>
@@ -2488,7 +2494,7 @@
           <a:p>
             <a:fld id="{7565E655-9687-48DF-A33F-F8824CCCB5D1}" type="datetime1">
               <a:rPr lang="en-US" smtClean="0"/>
-              <a:t>11/3/2025</a:t>
+              <a:t>11/4/2025</a:t>
             </a:fld>
             <a:endParaRPr lang="en-US"/>
           </a:p>
@@ -2787,7 +2793,7 @@
           <a:p>
             <a:fld id="{B97FD56A-AAB8-4544-A495-D0645413C9E3}" type="datetime1">
               <a:rPr lang="en-US" smtClean="0"/>
-              <a:t>11/3/2025</a:t>
+              <a:t>11/4/2025</a:t>
             </a:fld>
             <a:endParaRPr lang="en-US"/>
           </a:p>
@@ -4611,7 +4617,7 @@
             <a:fld id="{193BAB95-8DA7-460B-B00A-7037C8394FB0}" type="datetime1">
               <a:rPr lang="en-US" smtClean="0"/>
               <a:pPr/>
-              <a:t>11/3/2025</a:t>
+              <a:t>11/4/2025</a:t>
             </a:fld>
             <a:endParaRPr lang="en-US" dirty="0"/>
           </a:p>
@@ -16076,6 +16082,103 @@
 <file path=ppt/slides/slide15.xml><?xml version="1.0" encoding="utf-8"?>
 <p:sld xmlns:a="http://schemas.openxmlformats.org/drawingml/2006/main" xmlns:r="http://schemas.openxmlformats.org/officeDocument/2006/relationships" xmlns:p="http://schemas.openxmlformats.org/presentationml/2006/main">
   <p:cSld>
+    <p:spTree>
+      <p:nvGrpSpPr>
+        <p:cNvPr id="1" name=""/>
+        <p:cNvGrpSpPr/>
+        <p:nvPr/>
+      </p:nvGrpSpPr>
+      <p:grpSpPr>
+        <a:xfrm>
+          <a:off x="0" y="0"/>
+          <a:ext cx="0" cy="0"/>
+          <a:chOff x="0" y="0"/>
+          <a:chExt cx="0" cy="0"/>
+        </a:xfrm>
+      </p:grpSpPr>
+      <p:sp>
+        <p:nvSpPr>
+          <p:cNvPr id="2" name="Заголовок 1">
+            <a:extLst>
+              <a:ext uri="{FF2B5EF4-FFF2-40B4-BE49-F238E27FC236}">
+                <a16:creationId xmlns:a16="http://schemas.microsoft.com/office/drawing/2014/main" id="{B96FE846-8445-B658-B265-2A95974D9BBC}"/>
+              </a:ext>
+            </a:extLst>
+          </p:cNvPr>
+          <p:cNvSpPr>
+            <a:spLocks noGrp="1"/>
+          </p:cNvSpPr>
+          <p:nvPr>
+            <p:ph type="title"/>
+          </p:nvPr>
+        </p:nvSpPr>
+        <p:spPr/>
+        <p:txBody>
+          <a:bodyPr/>
+          <a:lstStyle/>
+          <a:p>
+            <a:r>
+              <a:rPr lang="uk-UA" dirty="0"/>
+              <a:t>Висновки</a:t>
+            </a:r>
+          </a:p>
+        </p:txBody>
+      </p:sp>
+      <p:sp>
+        <p:nvSpPr>
+          <p:cNvPr id="3" name="Місце для вмісту 2">
+            <a:extLst>
+              <a:ext uri="{FF2B5EF4-FFF2-40B4-BE49-F238E27FC236}">
+                <a16:creationId xmlns:a16="http://schemas.microsoft.com/office/drawing/2014/main" id="{9177CAF1-9699-27B1-9257-7552E0BF2008}"/>
+              </a:ext>
+            </a:extLst>
+          </p:cNvPr>
+          <p:cNvSpPr>
+            <a:spLocks noGrp="1"/>
+          </p:cNvSpPr>
+          <p:nvPr>
+            <p:ph idx="1"/>
+          </p:nvPr>
+        </p:nvSpPr>
+        <p:spPr/>
+        <p:txBody>
+          <a:bodyPr/>
+          <a:lstStyle/>
+          <a:p>
+            <a:r>
+              <a:rPr lang="uk-UA" dirty="0"/>
+              <a:t>Найбільше на </a:t>
+            </a:r>
+            <a:r>
+              <a:rPr lang="uk-UA" dirty="0" err="1"/>
+              <a:t>відгукуваність</a:t>
+            </a:r>
+            <a:r>
+              <a:rPr lang="uk-UA" dirty="0"/>
+              <a:t> впливають такі фактори як витрати на покупки, прибуток, кількість днів з останньої покупки і кількість дітей в сім’ї.</a:t>
+            </a:r>
+          </a:p>
+        </p:txBody>
+      </p:sp>
+    </p:spTree>
+    <p:extLst>
+      <p:ext uri="{BB962C8B-B14F-4D97-AF65-F5344CB8AC3E}">
+        <p14:creationId xmlns:p14="http://schemas.microsoft.com/office/powerpoint/2010/main" val="2893744273"/>
+      </p:ext>
+    </p:extLst>
+  </p:cSld>
+  <p:clrMapOvr>
+    <a:masterClrMapping/>
+  </p:clrMapOvr>
+  <p:transition spd="slow">
+    <p:wipe dir="r"/>
+  </p:transition>
+</p:sld>
+</file>
+
+<file path=ppt/slides/slide16.xml><?xml version="1.0" encoding="utf-8"?>
+<p:sld xmlns:a="http://schemas.openxmlformats.org/drawingml/2006/main" xmlns:r="http://schemas.openxmlformats.org/officeDocument/2006/relationships" xmlns:p="http://schemas.openxmlformats.org/presentationml/2006/main">
+  <p:cSld>
     <p:bg>
       <p:bgPr>
         <a:solidFill>
@@ -18266,13 +18369,13 @@
   <p:clrMapOvr>
     <a:masterClrMapping/>
   </p:clrMapOvr>
-  <mc:AlternateContent xmlns:mc="http://schemas.openxmlformats.org/markup-compatibility/2006">
-    <mc:Choice xmlns:p14="http://schemas.microsoft.com/office/powerpoint/2010/main" Requires="p14">
+  <mc:AlternateContent xmlns:mc="http://schemas.openxmlformats.org/markup-compatibility/2006" xmlns:p14="http://schemas.microsoft.com/office/powerpoint/2010/main">
+    <mc:Choice Requires="p14">
       <p:transition spd="slow" p14:dur="1200">
         <p14:prism/>
       </p:transition>
     </mc:Choice>
-    <mc:Fallback>
+    <mc:Fallback xmlns="">
       <p:transition spd="slow">
         <p:fade/>
       </p:transition>

</xml_diff>